<commit_message>
Updating sample code to specify TA0 and updating slides to fix a minor error
</commit_message>
<xml_diff>
--- a/notes/L25/Lsn25.pptx
+++ b/notes/L25/Lsn25.pptx
@@ -8535,7 +8535,7 @@
                 </a:solidFill>
                 <a:latin typeface="Consolas"/>
               </a:rPr>
-              <a:t>   TACCR0 </a:t>
+              <a:t>   TA0CCR0 </a:t>
             </a:r>
             <a:r>
               <a:rPr lang="en-US" sz="1200" dirty="0">
@@ -8567,7 +8567,25 @@
                 </a:solidFill>
                 <a:latin typeface="Consolas"/>
               </a:rPr>
-              <a:t>    TACTL &amp;= ~TAIFG;                     </a:t>
+              <a:t>    </a:t>
+            </a:r>
+            <a:r>
+              <a:rPr lang="en-US" sz="1200" dirty="0" smtClean="0">
+                <a:solidFill>
+                  <a:srgbClr val="000000"/>
+                </a:solidFill>
+                <a:latin typeface="Consolas"/>
+              </a:rPr>
+              <a:t>TA0CTL </a:t>
+            </a:r>
+            <a:r>
+              <a:rPr lang="en-US" sz="1200" dirty="0">
+                <a:solidFill>
+                  <a:srgbClr val="000000"/>
+                </a:solidFill>
+                <a:latin typeface="Consolas"/>
+              </a:rPr>
+              <a:t>&amp;= ~TAIFG;                     </a:t>
             </a:r>
             <a:r>
               <a:rPr lang="en-US" sz="1200" dirty="0">
@@ -8593,7 +8611,25 @@
                 </a:solidFill>
                 <a:latin typeface="Consolas"/>
               </a:rPr>
-              <a:t>    TACTL |= ID_0 | TASSEL_2 | MC_1</a:t>
+              <a:t>    </a:t>
+            </a:r>
+            <a:r>
+              <a:rPr lang="en-US" sz="1200" dirty="0" smtClean="0">
+                <a:solidFill>
+                  <a:srgbClr val="000000"/>
+                </a:solidFill>
+                <a:latin typeface="Consolas"/>
+              </a:rPr>
+              <a:t>TA0CTL </a:t>
+            </a:r>
+            <a:r>
+              <a:rPr lang="en-US" sz="1200" dirty="0">
+                <a:solidFill>
+                  <a:srgbClr val="000000"/>
+                </a:solidFill>
+                <a:latin typeface="Consolas"/>
+              </a:rPr>
+              <a:t>|= ID_0 | TASSEL_2 | MC_1</a:t>
             </a:r>
             <a:r>
               <a:rPr lang="en-US" sz="1200" dirty="0" smtClean="0">
@@ -8704,7 +8740,25 @@
                 </a:solidFill>
                 <a:latin typeface="Consolas"/>
               </a:rPr>
-              <a:t> ((TACTL &amp; TAIFG) == 0</a:t>
+              <a:t> ((</a:t>
+            </a:r>
+            <a:r>
+              <a:rPr lang="en-US" sz="1200" b="1" dirty="0" smtClean="0">
+                <a:solidFill>
+                  <a:srgbClr val="000000"/>
+                </a:solidFill>
+                <a:latin typeface="Consolas"/>
+              </a:rPr>
+              <a:t>TA0CTL </a:t>
+            </a:r>
+            <a:r>
+              <a:rPr lang="en-US" sz="1200" b="1" dirty="0">
+                <a:solidFill>
+                  <a:srgbClr val="000000"/>
+                </a:solidFill>
+                <a:latin typeface="Consolas"/>
+              </a:rPr>
+              <a:t>&amp; TAIFG) == 0</a:t>
             </a:r>
             <a:r>
               <a:rPr lang="en-US" sz="1200" b="1" dirty="0" smtClean="0">
@@ -8760,7 +8814,25 @@
                 </a:solidFill>
                 <a:latin typeface="Consolas"/>
               </a:rPr>
-              <a:t>    TACTL &amp;= ~TAIFG</a:t>
+              <a:t>    </a:t>
+            </a:r>
+            <a:r>
+              <a:rPr lang="en-US" sz="1200" dirty="0" smtClean="0">
+                <a:solidFill>
+                  <a:srgbClr val="000000"/>
+                </a:solidFill>
+                <a:latin typeface="Consolas"/>
+              </a:rPr>
+              <a:t>TA0CTL </a:t>
+            </a:r>
+            <a:r>
+              <a:rPr lang="en-US" sz="1200" dirty="0">
+                <a:solidFill>
+                  <a:srgbClr val="000000"/>
+                </a:solidFill>
+                <a:latin typeface="Consolas"/>
+              </a:rPr>
+              <a:t>&amp;= ~TAIFG</a:t>
             </a:r>
             <a:r>
               <a:rPr lang="en-US" sz="1200" dirty="0" smtClean="0">
@@ -16260,7 +16332,7 @@
               <a:t>sec          2 </a:t>
             </a:r>
             <a:r>
-              <a:rPr lang="en-US" sz="1600" dirty="0">
+              <a:rPr lang="en-US" sz="1600" dirty="0" err="1">
                 <a:solidFill>
                   <a:srgbClr val="333333"/>
                 </a:solidFill>
@@ -16268,7 +16340,51 @@
                 <a:ea typeface="Times New Roman"/>
                 <a:cs typeface="Times New Roman"/>
               </a:rPr>
-              <a:t>clks     2^16 </a:t>
+              <a:t>clks</a:t>
+            </a:r>
+            <a:r>
+              <a:rPr lang="en-US" sz="1600" dirty="0">
+                <a:solidFill>
+                  <a:srgbClr val="333333"/>
+                </a:solidFill>
+                <a:latin typeface="Consolas"/>
+                <a:ea typeface="Times New Roman"/>
+                <a:cs typeface="Times New Roman"/>
+              </a:rPr>
+              <a:t>     </a:t>
+            </a:r>
+            <a:r>
+              <a:rPr lang="en-US" sz="1600" dirty="0" smtClean="0">
+                <a:solidFill>
+                  <a:srgbClr val="333333"/>
+                </a:solidFill>
+                <a:latin typeface="Consolas"/>
+                <a:ea typeface="Times New Roman"/>
+                <a:cs typeface="Times New Roman"/>
+              </a:rPr>
+              <a:t>2^</a:t>
+            </a:r>
+            <a:r>
+              <a:rPr lang="en-US" sz="1600" baseline="30000" dirty="0" smtClean="0">
+                <a:solidFill>
+                  <a:srgbClr val="333333"/>
+                </a:solidFill>
+                <a:latin typeface="Consolas"/>
+                <a:ea typeface="Times New Roman"/>
+                <a:cs typeface="Times New Roman"/>
+              </a:rPr>
+              <a:t>16</a:t>
+            </a:r>
+            <a:r>
+              <a:rPr lang="en-US" sz="1600" dirty="0" smtClean="0">
+                <a:solidFill>
+                  <a:srgbClr val="333333"/>
+                </a:solidFill>
+                <a:latin typeface="Consolas"/>
+                <a:ea typeface="Times New Roman"/>
+                <a:cs typeface="Times New Roman"/>
+              </a:rPr>
+              <a:t>-1 </a:t>
             </a:r>
             <a:r>
               <a:rPr lang="en-US" sz="1600" dirty="0" err="1">
@@ -17637,7 +17753,7 @@
               <a:t>sec          4 </a:t>
             </a:r>
             <a:r>
-              <a:rPr lang="en-US" sz="1600" dirty="0">
+              <a:rPr lang="en-US" sz="1600" dirty="0" err="1">
                 <a:solidFill>
                   <a:srgbClr val="333333"/>
                 </a:solidFill>
@@ -17645,10 +17761,54 @@
                 <a:ea typeface="Times New Roman"/>
                 <a:cs typeface="Times New Roman"/>
               </a:rPr>
-              <a:t>clks     2^16 </a:t>
-            </a:r>
-            <a:r>
-              <a:rPr lang="en-US" sz="1600" dirty="0" err="1">
+              <a:t>clks</a:t>
+            </a:r>
+            <a:r>
+              <a:rPr lang="en-US" sz="1600" dirty="0">
+                <a:solidFill>
+                  <a:srgbClr val="333333"/>
+                </a:solidFill>
+                <a:latin typeface="Consolas"/>
+                <a:ea typeface="Times New Roman"/>
+                <a:cs typeface="Times New Roman"/>
+              </a:rPr>
+              <a:t> </a:t>
+            </a:r>
+            <a:r>
+              <a:rPr lang="en-US" sz="1600" dirty="0" smtClean="0">
+                <a:solidFill>
+                  <a:srgbClr val="333333"/>
+                </a:solidFill>
+                <a:latin typeface="Consolas"/>
+                <a:ea typeface="Times New Roman"/>
+                <a:cs typeface="Times New Roman"/>
+              </a:rPr>
+              <a:t>    2^</a:t>
+            </a:r>
+            <a:r>
+              <a:rPr lang="en-US" sz="1600" baseline="30000" dirty="0">
+                <a:solidFill>
+                  <a:srgbClr val="333333"/>
+                </a:solidFill>
+                <a:latin typeface="Consolas"/>
+                <a:ea typeface="Times New Roman"/>
+                <a:cs typeface="Times New Roman"/>
+              </a:rPr>
+              <a:t>16</a:t>
+            </a:r>
+            <a:r>
+              <a:rPr lang="en-US" sz="1600" dirty="0">
+                <a:solidFill>
+                  <a:srgbClr val="333333"/>
+                </a:solidFill>
+                <a:latin typeface="Consolas"/>
+                <a:ea typeface="Times New Roman"/>
+                <a:cs typeface="Times New Roman"/>
+              </a:rPr>
+              <a:t>-1 </a:t>
+            </a:r>
+            <a:r>
+              <a:rPr lang="en-US" sz="1600" dirty="0" err="1" smtClean="0">
                 <a:solidFill>
                   <a:srgbClr val="333333"/>
                 </a:solidFill>
@@ -19250,7 +19410,7 @@
               <a:t>sec          8 </a:t>
             </a:r>
             <a:r>
-              <a:rPr lang="en-US" sz="1600" dirty="0">
+              <a:rPr lang="en-US" sz="1600" dirty="0" err="1">
                 <a:solidFill>
                   <a:srgbClr val="333333"/>
                 </a:solidFill>
@@ -19258,7 +19418,51 @@
                 <a:ea typeface="Times New Roman"/>
                 <a:cs typeface="Times New Roman"/>
               </a:rPr>
-              <a:t>clks     2^16 </a:t>
+              <a:t>clks</a:t>
+            </a:r>
+            <a:r>
+              <a:rPr lang="en-US" sz="1600" dirty="0">
+                <a:solidFill>
+                  <a:srgbClr val="333333"/>
+                </a:solidFill>
+                <a:latin typeface="Consolas"/>
+                <a:ea typeface="Times New Roman"/>
+                <a:cs typeface="Times New Roman"/>
+              </a:rPr>
+              <a:t>     </a:t>
+            </a:r>
+            <a:r>
+              <a:rPr lang="en-US" sz="1600" dirty="0" smtClean="0">
+                <a:solidFill>
+                  <a:srgbClr val="333333"/>
+                </a:solidFill>
+                <a:latin typeface="Consolas"/>
+                <a:ea typeface="Times New Roman"/>
+                <a:cs typeface="Times New Roman"/>
+              </a:rPr>
+              <a:t>2^</a:t>
+            </a:r>
+            <a:r>
+              <a:rPr lang="en-US" sz="1600" baseline="30000" dirty="0">
+                <a:solidFill>
+                  <a:srgbClr val="333333"/>
+                </a:solidFill>
+                <a:latin typeface="Consolas"/>
+                <a:ea typeface="Times New Roman"/>
+                <a:cs typeface="Times New Roman"/>
+              </a:rPr>
+              <a:t>16</a:t>
+            </a:r>
+            <a:r>
+              <a:rPr lang="en-US" sz="1600" dirty="0">
+                <a:solidFill>
+                  <a:srgbClr val="333333"/>
+                </a:solidFill>
+                <a:latin typeface="Consolas"/>
+                <a:ea typeface="Times New Roman"/>
+                <a:cs typeface="Times New Roman"/>
+              </a:rPr>
+              <a:t>-1 </a:t>
             </a:r>
             <a:r>
               <a:rPr lang="en-US" sz="1600" dirty="0" err="1">
@@ -19320,10 +19524,10 @@
                 <a:ea typeface="Times New Roman"/>
                 <a:cs typeface="Times New Roman"/>
               </a:rPr>
-              <a:t> ------------ * ------ * --------------- = </a:t>
-            </a:r>
-            <a:r>
-              <a:rPr lang="en-US" sz="1600" dirty="0" smtClean="0">
+              <a:t> ------------ * ------ * --------------- </a:t>
+            </a:r>
+            <a:r>
+              <a:rPr lang="en-US" sz="1600">
                 <a:solidFill>
                   <a:srgbClr val="333333"/>
                 </a:solidFill>
@@ -19331,7 +19535,18 @@
                 <a:ea typeface="Times New Roman"/>
                 <a:cs typeface="Times New Roman"/>
               </a:rPr>
-              <a:t>65.536 </a:t>
+              <a:t>= </a:t>
+            </a:r>
+            <a:r>
+              <a:rPr lang="en-US" sz="1600" smtClean="0">
+                <a:solidFill>
+                  <a:srgbClr val="333333"/>
+                </a:solidFill>
+                <a:latin typeface="Consolas"/>
+                <a:ea typeface="Times New Roman"/>
+                <a:cs typeface="Times New Roman"/>
+              </a:rPr>
+              <a:t>65.535 </a:t>
             </a:r>
             <a:r>
               <a:rPr lang="en-US" sz="1600" dirty="0" err="1" smtClean="0">

</xml_diff>